<commit_message>
added counties and plot
</commit_message>
<xml_diff>
--- a/HsSurvey Update.pptx
+++ b/HsSurvey Update.pptx
@@ -123,6 +123,11 @@
       </a:defRPr>
     </a:lvl9pPr>
   </p:defaultTextStyle>
+  <p:extLst>
+    <p:ext uri="{EFAFB233-063F-42B5-8137-9DF3F51BA10A}">
+      <p15:sldGuideLst xmlns:p15="http://schemas.microsoft.com/office/powerpoint/2012/main"/>
+    </p:ext>
+  </p:extLst>
 </p:presentation>
 </file>
 
@@ -6328,7 +6333,7 @@
           <a:p>
             <a:fld id="{C64ED74D-749E-4465-8831-FAB92A445E31}" type="datetimeFigureOut">
               <a:rPr lang="en-US" smtClean="0"/>
-              <a:t>3/22/2020</a:t>
+              <a:t>3/23/2020</a:t>
             </a:fld>
             <a:endParaRPr lang="en-US"/>
           </a:p>
@@ -6711,28 +6716,389 @@
         </p:nvSpPr>
         <p:spPr/>
       </p:sp>
-      <p:sp>
-        <p:nvSpPr>
-          <p:cNvPr id="3" name="Notes Placeholder 2"/>
-          <p:cNvSpPr>
-            <a:spLocks noGrp="1"/>
-          </p:cNvSpPr>
-          <p:nvPr>
-            <p:ph type="body" idx="1"/>
-          </p:nvPr>
-        </p:nvSpPr>
-        <p:spPr/>
-        <p:txBody>
-          <a:bodyPr/>
-          <a:lstStyle/>
-          <a:p>
-            <a:r>
-              <a:rPr lang="en-US" dirty="0"/>
-              <a:t>Using equation, we added species as a multiplicative effect on abundance to determine significant differences </a:t>
-            </a:r>
-          </a:p>
-        </p:txBody>
-      </p:sp>
+      <mc:AlternateContent xmlns:mc="http://schemas.openxmlformats.org/markup-compatibility/2006">
+        <mc:Choice xmlns:a14="http://schemas.microsoft.com/office/drawing/2010/main" Requires="a14">
+          <p:sp>
+            <p:nvSpPr>
+              <p:cNvPr id="3" name="Notes Placeholder 2"/>
+              <p:cNvSpPr>
+                <a:spLocks noGrp="1"/>
+              </p:cNvSpPr>
+              <p:nvPr>
+                <p:ph type="body" idx="1"/>
+              </p:nvPr>
+            </p:nvSpPr>
+            <p:spPr/>
+            <p:txBody>
+              <a:bodyPr/>
+              <a:lstStyle/>
+              <a:p>
+                <a:r>
+                  <a:rPr lang="en-US" dirty="0"/>
+                  <a:t>We fit the regression using log transformed data Y = b + m1x +m2Fx</a:t>
+                </a:r>
+              </a:p>
+              <a:p>
+                <a:r>
+                  <a:rPr lang="en-US" baseline="0" dirty="0">
+                    <a:cs typeface="Arial" panose="020B0604020202020204" pitchFamily="34" charset="0"/>
+                  </a:rPr>
+                  <a:t> </a:t>
+                </a:r>
+                <a14:m>
+                  <m:oMath xmlns:m="http://schemas.openxmlformats.org/officeDocument/2006/math">
+                    <m:sSub>
+                      <m:sSubPr>
+                        <m:ctrlPr>
+                          <a:rPr lang="en-US" i="1" smtClean="0">
+                            <a:latin typeface="Cambria Math" panose="02040503050406030204" pitchFamily="18" charset="0"/>
+                            <a:cs typeface="Arial" panose="020B0604020202020204" pitchFamily="34" charset="0"/>
+                          </a:rPr>
+                        </m:ctrlPr>
+                      </m:sSubPr>
+                      <m:e>
+                        <m:func>
+                          <m:funcPr>
+                            <m:ctrlPr>
+                              <a:rPr lang="en-US" b="0" i="1" smtClean="0">
+                                <a:latin typeface="Cambria Math" panose="02040503050406030204" pitchFamily="18" charset="0"/>
+                                <a:cs typeface="Arial" panose="020B0604020202020204" pitchFamily="34" charset="0"/>
+                              </a:rPr>
+                            </m:ctrlPr>
+                          </m:funcPr>
+                          <m:fName>
+                            <m:r>
+                              <m:rPr>
+                                <m:sty m:val="p"/>
+                              </m:rPr>
+                              <a:rPr lang="en-US" b="0" i="0" smtClean="0">
+                                <a:latin typeface="Cambria Math" panose="02040503050406030204" pitchFamily="18" charset="0"/>
+                                <a:cs typeface="Arial" panose="020B0604020202020204" pitchFamily="34" charset="0"/>
+                              </a:rPr>
+                              <m:t>log</m:t>
+                            </m:r>
+                          </m:fName>
+                          <m:e>
+                            <m:d>
+                              <m:dPr>
+                                <m:ctrlPr>
+                                  <a:rPr lang="en-US" b="0" i="1" smtClean="0">
+                                    <a:latin typeface="Cambria Math" panose="02040503050406030204" pitchFamily="18" charset="0"/>
+                                    <a:cs typeface="Arial" panose="020B0604020202020204" pitchFamily="34" charset="0"/>
+                                  </a:rPr>
+                                </m:ctrlPr>
+                              </m:dPr>
+                              <m:e>
+                                <m:r>
+                                  <a:rPr lang="en-US" b="0" i="1" smtClean="0">
+                                    <a:latin typeface="Cambria Math" panose="02040503050406030204" pitchFamily="18" charset="0"/>
+                                    <a:cs typeface="Arial" panose="020B0604020202020204" pitchFamily="34" charset="0"/>
+                                  </a:rPr>
+                                  <m:t>𝐶𝑃𝑈𝐸</m:t>
+                                </m:r>
+                              </m:e>
+                            </m:d>
+                          </m:e>
+                        </m:func>
+                        <m:r>
+                          <a:rPr lang="en-US" b="0" i="1" smtClean="0">
+                            <a:latin typeface="Cambria Math" panose="02040503050406030204" pitchFamily="18" charset="0"/>
+                            <a:cs typeface="Arial" panose="020B0604020202020204" pitchFamily="34" charset="0"/>
+                          </a:rPr>
+                          <m:t>=</m:t>
+                        </m:r>
+                        <m:r>
+                          <a:rPr lang="en-US" i="1">
+                            <a:latin typeface="Cambria Math" panose="02040503050406030204" pitchFamily="18" charset="0"/>
+                            <a:ea typeface="Cambria Math" panose="02040503050406030204" pitchFamily="18" charset="0"/>
+                            <a:cs typeface="Arial" panose="020B0604020202020204" pitchFamily="34" charset="0"/>
+                          </a:rPr>
+                          <m:t>𝛽</m:t>
+                        </m:r>
+                      </m:e>
+                      <m:sub>
+                        <m:r>
+                          <a:rPr lang="en-US" b="0" i="1" smtClean="0">
+                            <a:latin typeface="Cambria Math" panose="02040503050406030204" pitchFamily="18" charset="0"/>
+                            <a:cs typeface="Arial" panose="020B0604020202020204" pitchFamily="34" charset="0"/>
+                          </a:rPr>
+                          <m:t>0 </m:t>
+                        </m:r>
+                      </m:sub>
+                    </m:sSub>
+                    <m:r>
+                      <a:rPr lang="en-US" b="0" i="0" smtClean="0">
+                        <a:latin typeface="Cambria Math" panose="02040503050406030204" pitchFamily="18" charset="0"/>
+                        <a:cs typeface="Arial" panose="020B0604020202020204" pitchFamily="34" charset="0"/>
+                      </a:rPr>
+                      <m:t>+ </m:t>
+                    </m:r>
+                    <m:sSub>
+                      <m:sSubPr>
+                        <m:ctrlPr>
+                          <a:rPr lang="el-GR" b="0" i="1" smtClean="0">
+                            <a:latin typeface="Cambria Math" panose="02040503050406030204" pitchFamily="18" charset="0"/>
+                            <a:ea typeface="Cambria Math" panose="02040503050406030204" pitchFamily="18" charset="0"/>
+                            <a:cs typeface="Arial" panose="020B0604020202020204" pitchFamily="34" charset="0"/>
+                          </a:rPr>
+                        </m:ctrlPr>
+                      </m:sSubPr>
+                      <m:e>
+                        <m:r>
+                          <a:rPr lang="el-GR" b="0" i="1" smtClean="0">
+                            <a:latin typeface="Cambria Math" panose="02040503050406030204" pitchFamily="18" charset="0"/>
+                            <a:ea typeface="Cambria Math" panose="02040503050406030204" pitchFamily="18" charset="0"/>
+                            <a:cs typeface="Arial" panose="020B0604020202020204" pitchFamily="34" charset="0"/>
+                          </a:rPr>
+                          <m:t>𝛽</m:t>
+                        </m:r>
+                      </m:e>
+                      <m:sub>
+                        <m:r>
+                          <a:rPr lang="en-US" b="0" i="1" smtClean="0">
+                            <a:latin typeface="Cambria Math" panose="02040503050406030204" pitchFamily="18" charset="0"/>
+                            <a:ea typeface="Cambria Math" panose="02040503050406030204" pitchFamily="18" charset="0"/>
+                            <a:cs typeface="Arial" panose="020B0604020202020204" pitchFamily="34" charset="0"/>
+                          </a:rPr>
+                          <m:t>1</m:t>
+                        </m:r>
+                      </m:sub>
+                    </m:sSub>
+                    <m:r>
+                      <a:rPr lang="el-GR" b="0" i="1" smtClean="0">
+                        <a:latin typeface="Cambria Math" panose="02040503050406030204" pitchFamily="18" charset="0"/>
+                        <a:ea typeface="Cambria Math" panose="02040503050406030204" pitchFamily="18" charset="0"/>
+                        <a:cs typeface="Arial" panose="020B0604020202020204" pitchFamily="34" charset="0"/>
+                      </a:rPr>
+                      <m:t>∙</m:t>
+                    </m:r>
+                    <m:r>
+                      <m:rPr>
+                        <m:sty m:val="p"/>
+                      </m:rPr>
+                      <a:rPr lang="en-US" b="0" i="0" smtClean="0">
+                        <a:latin typeface="Cambria Math" panose="02040503050406030204" pitchFamily="18" charset="0"/>
+                        <a:ea typeface="Cambria Math" panose="02040503050406030204" pitchFamily="18" charset="0"/>
+                        <a:cs typeface="Arial" panose="020B0604020202020204" pitchFamily="34" charset="0"/>
+                      </a:rPr>
+                      <m:t>log</m:t>
+                    </m:r>
+                    <m:r>
+                      <a:rPr lang="en-US" b="0" i="1" smtClean="0">
+                        <a:latin typeface="Cambria Math" panose="02040503050406030204" pitchFamily="18" charset="0"/>
+                        <a:ea typeface="Cambria Math" panose="02040503050406030204" pitchFamily="18" charset="0"/>
+                        <a:cs typeface="Arial" panose="020B0604020202020204" pitchFamily="34" charset="0"/>
+                      </a:rPr>
+                      <m:t>⁡(</m:t>
+                    </m:r>
+                    <m:r>
+                      <a:rPr lang="en-US" b="0" i="1" smtClean="0">
+                        <a:latin typeface="Cambria Math" panose="02040503050406030204" pitchFamily="18" charset="0"/>
+                        <a:ea typeface="Cambria Math" panose="02040503050406030204" pitchFamily="18" charset="0"/>
+                        <a:cs typeface="Arial" panose="020B0604020202020204" pitchFamily="34" charset="0"/>
+                      </a:rPr>
+                      <m:t>𝑒𝑓𝐶𝑃𝑈𝐸</m:t>
+                    </m:r>
+                    <m:r>
+                      <a:rPr lang="en-US" b="0" i="1" smtClean="0">
+                        <a:latin typeface="Cambria Math" panose="02040503050406030204" pitchFamily="18" charset="0"/>
+                        <a:ea typeface="Cambria Math" panose="02040503050406030204" pitchFamily="18" charset="0"/>
+                        <a:cs typeface="Arial" panose="020B0604020202020204" pitchFamily="34" charset="0"/>
+                      </a:rPr>
+                      <m:t>)+ </m:t>
+                    </m:r>
+                    <m:sSub>
+                      <m:sSubPr>
+                        <m:ctrlPr>
+                          <a:rPr lang="en-US" b="0" i="1" smtClean="0">
+                            <a:latin typeface="Cambria Math" panose="02040503050406030204" pitchFamily="18" charset="0"/>
+                            <a:ea typeface="Cambria Math" panose="02040503050406030204" pitchFamily="18" charset="0"/>
+                            <a:cs typeface="Arial" panose="020B0604020202020204" pitchFamily="34" charset="0"/>
+                          </a:rPr>
+                        </m:ctrlPr>
+                      </m:sSubPr>
+                      <m:e>
+                        <m:r>
+                          <a:rPr lang="en-US" b="0" i="1" smtClean="0">
+                            <a:latin typeface="Cambria Math" panose="02040503050406030204" pitchFamily="18" charset="0"/>
+                            <a:ea typeface="Cambria Math" panose="02040503050406030204" pitchFamily="18" charset="0"/>
+                            <a:cs typeface="Arial" panose="020B0604020202020204" pitchFamily="34" charset="0"/>
+                          </a:rPr>
+                          <m:t>𝛽</m:t>
+                        </m:r>
+                      </m:e>
+                      <m:sub>
+                        <m:r>
+                          <a:rPr lang="en-US" b="0" i="1" smtClean="0">
+                            <a:latin typeface="Cambria Math" panose="02040503050406030204" pitchFamily="18" charset="0"/>
+                            <a:ea typeface="Cambria Math" panose="02040503050406030204" pitchFamily="18" charset="0"/>
+                            <a:cs typeface="Arial" panose="020B0604020202020204" pitchFamily="34" charset="0"/>
+                          </a:rPr>
+                          <m:t>2</m:t>
+                        </m:r>
+                      </m:sub>
+                    </m:sSub>
+                    <m:r>
+                      <a:rPr lang="en-US" b="0" i="1" smtClean="0">
+                        <a:latin typeface="Cambria Math" panose="02040503050406030204" pitchFamily="18" charset="0"/>
+                        <a:ea typeface="Cambria Math" panose="02040503050406030204" pitchFamily="18" charset="0"/>
+                        <a:cs typeface="Arial" panose="020B0604020202020204" pitchFamily="34" charset="0"/>
+                      </a:rPr>
+                      <m:t>∙</m:t>
+                    </m:r>
+                    <m:r>
+                      <a:rPr lang="en-US" b="0" i="1" smtClean="0">
+                        <a:latin typeface="Cambria Math" panose="02040503050406030204" pitchFamily="18" charset="0"/>
+                        <a:ea typeface="Cambria Math" panose="02040503050406030204" pitchFamily="18" charset="0"/>
+                        <a:cs typeface="Arial" panose="020B0604020202020204" pitchFamily="34" charset="0"/>
+                      </a:rPr>
+                      <m:t>𝑠𝑝𝑒𝑐𝑖𝑒𝑠</m:t>
+                    </m:r>
+                    <m:r>
+                      <a:rPr lang="en-US" b="0" i="1" smtClean="0">
+                        <a:latin typeface="Cambria Math" panose="02040503050406030204" pitchFamily="18" charset="0"/>
+                        <a:ea typeface="Cambria Math" panose="02040503050406030204" pitchFamily="18" charset="0"/>
+                        <a:cs typeface="Arial" panose="020B0604020202020204" pitchFamily="34" charset="0"/>
+                      </a:rPr>
+                      <m:t>∙</m:t>
+                    </m:r>
+                    <m:r>
+                      <m:rPr>
+                        <m:sty m:val="p"/>
+                      </m:rPr>
+                      <a:rPr lang="en-US" b="0" i="0" smtClean="0">
+                        <a:latin typeface="Cambria Math" panose="02040503050406030204" pitchFamily="18" charset="0"/>
+                        <a:ea typeface="Cambria Math" panose="02040503050406030204" pitchFamily="18" charset="0"/>
+                        <a:cs typeface="Arial" panose="020B0604020202020204" pitchFamily="34" charset="0"/>
+                      </a:rPr>
+                      <m:t>log</m:t>
+                    </m:r>
+                    <m:r>
+                      <a:rPr lang="en-US" b="0" i="1" smtClean="0">
+                        <a:latin typeface="Cambria Math" panose="02040503050406030204" pitchFamily="18" charset="0"/>
+                        <a:ea typeface="Cambria Math" panose="02040503050406030204" pitchFamily="18" charset="0"/>
+                        <a:cs typeface="Arial" panose="020B0604020202020204" pitchFamily="34" charset="0"/>
+                      </a:rPr>
+                      <m:t>⁡(</m:t>
+                    </m:r>
+                    <m:r>
+                      <a:rPr lang="en-US" b="0" i="1" smtClean="0">
+                        <a:latin typeface="Cambria Math" panose="02040503050406030204" pitchFamily="18" charset="0"/>
+                        <a:ea typeface="Cambria Math" panose="02040503050406030204" pitchFamily="18" charset="0"/>
+                        <a:cs typeface="Arial" panose="020B0604020202020204" pitchFamily="34" charset="0"/>
+                      </a:rPr>
+                      <m:t>𝑒𝑓𝐶𝑃𝑈𝐸</m:t>
+                    </m:r>
+                    <m:r>
+                      <a:rPr lang="en-US" b="0" i="1" smtClean="0">
+                        <a:latin typeface="Cambria Math" panose="02040503050406030204" pitchFamily="18" charset="0"/>
+                        <a:ea typeface="Cambria Math" panose="02040503050406030204" pitchFamily="18" charset="0"/>
+                        <a:cs typeface="Arial" panose="020B0604020202020204" pitchFamily="34" charset="0"/>
+                      </a:rPr>
+                      <m:t>)</m:t>
+                    </m:r>
+                  </m:oMath>
+                </a14:m>
+                <a:endParaRPr lang="en-US" dirty="0"/>
+              </a:p>
+            </p:txBody>
+          </p:sp>
+        </mc:Choice>
+        <mc:Fallback>
+          <p:sp>
+            <p:nvSpPr>
+              <p:cNvPr id="3" name="Notes Placeholder 2"/>
+              <p:cNvSpPr>
+                <a:spLocks noGrp="1"/>
+              </p:cNvSpPr>
+              <p:nvPr>
+                <p:ph type="body" idx="1"/>
+              </p:nvPr>
+            </p:nvSpPr>
+            <p:spPr/>
+            <p:txBody>
+              <a:bodyPr/>
+              <a:lstStyle/>
+              <a:p>
+                <a:r>
+                  <a:rPr lang="en-US" dirty="0"/>
+                  <a:t>We fit the regression using log transformed data Y = b + m1x +m2Fx</a:t>
+                </a:r>
+              </a:p>
+              <a:p>
+                <a:r>
+                  <a:rPr lang="en-US" baseline="0" dirty="0">
+                    <a:cs typeface="Arial" panose="020B0604020202020204" pitchFamily="34" charset="0"/>
+                  </a:rPr>
+                  <a:t> </a:t>
+                </a:r>
+                <a:r>
+                  <a:rPr lang="en-US" i="0">
+                    <a:latin typeface="Cambria Math" panose="02040503050406030204" pitchFamily="18" charset="0"/>
+                    <a:cs typeface="Arial" panose="020B0604020202020204" pitchFamily="34" charset="0"/>
+                  </a:rPr>
+                  <a:t>〖</a:t>
+                </a:r>
+                <a:r>
+                  <a:rPr lang="en-US" b="0" i="0">
+                    <a:latin typeface="Cambria Math" panose="02040503050406030204" pitchFamily="18" charset="0"/>
+                    <a:cs typeface="Arial" panose="020B0604020202020204" pitchFamily="34" charset="0"/>
+                  </a:rPr>
+                  <a:t>log⁡(𝐶𝑃𝑈𝐸)=</a:t>
+                </a:r>
+                <a:r>
+                  <a:rPr lang="en-US" i="0">
+                    <a:latin typeface="Cambria Math" panose="02040503050406030204" pitchFamily="18" charset="0"/>
+                    <a:ea typeface="Cambria Math" panose="02040503050406030204" pitchFamily="18" charset="0"/>
+                    <a:cs typeface="Arial" panose="020B0604020202020204" pitchFamily="34" charset="0"/>
+                  </a:rPr>
+                  <a:t>𝛽〗_(</a:t>
+                </a:r>
+                <a:r>
+                  <a:rPr lang="en-US" b="0" i="0">
+                    <a:latin typeface="Cambria Math" panose="02040503050406030204" pitchFamily="18" charset="0"/>
+                    <a:cs typeface="Arial" panose="020B0604020202020204" pitchFamily="34" charset="0"/>
+                  </a:rPr>
+                  <a:t>0 )+ </a:t>
+                </a:r>
+                <a:r>
+                  <a:rPr lang="el-GR" b="0" i="0">
+                    <a:latin typeface="Cambria Math" panose="02040503050406030204" pitchFamily="18" charset="0"/>
+                    <a:ea typeface="Cambria Math" panose="02040503050406030204" pitchFamily="18" charset="0"/>
+                    <a:cs typeface="Arial" panose="020B0604020202020204" pitchFamily="34" charset="0"/>
+                  </a:rPr>
+                  <a:t>𝛽_</a:t>
+                </a:r>
+                <a:r>
+                  <a:rPr lang="en-US" b="0" i="0">
+                    <a:latin typeface="Cambria Math" panose="02040503050406030204" pitchFamily="18" charset="0"/>
+                    <a:ea typeface="Cambria Math" panose="02040503050406030204" pitchFamily="18" charset="0"/>
+                    <a:cs typeface="Arial" panose="020B0604020202020204" pitchFamily="34" charset="0"/>
+                  </a:rPr>
+                  <a:t>1</a:t>
+                </a:r>
+                <a:r>
+                  <a:rPr lang="el-GR" b="0" i="0">
+                    <a:latin typeface="Cambria Math" panose="02040503050406030204" pitchFamily="18" charset="0"/>
+                    <a:ea typeface="Cambria Math" panose="02040503050406030204" pitchFamily="18" charset="0"/>
+                    <a:cs typeface="Arial" panose="020B0604020202020204" pitchFamily="34" charset="0"/>
+                  </a:rPr>
+                  <a:t>∙</a:t>
+                </a:r>
+                <a:r>
+                  <a:rPr lang="en-US" b="0" i="0">
+                    <a:latin typeface="Cambria Math" panose="02040503050406030204" pitchFamily="18" charset="0"/>
+                    <a:ea typeface="Cambria Math" panose="02040503050406030204" pitchFamily="18" charset="0"/>
+                    <a:cs typeface="Arial" panose="020B0604020202020204" pitchFamily="34" charset="0"/>
+                  </a:rPr>
+                  <a:t>log⁡(𝑒𝑓𝐶𝑃𝑈𝐸)+ 𝛽_2∙𝑠𝑝𝑒𝑐𝑖𝑒𝑠∙log⁡(𝑒𝑓𝐶𝑃𝑈𝐸)</a:t>
+                </a:r>
+                <a:endParaRPr lang="en-US" dirty="0"/>
+              </a:p>
+            </p:txBody>
+          </p:sp>
+        </mc:Fallback>
+      </mc:AlternateContent>
       <p:sp>
         <p:nvSpPr>
           <p:cNvPr id="4" name="Slide Number Placeholder 3"/>
@@ -6916,7 +7282,7 @@
           <a:p>
             <a:fld id="{04426929-A8C9-4C88-B674-D857B16FADC0}" type="datetimeFigureOut">
               <a:rPr lang="en-US" smtClean="0"/>
-              <a:t>3/22/2020</a:t>
+              <a:t>3/23/2020</a:t>
             </a:fld>
             <a:endParaRPr lang="en-US"/>
           </a:p>
@@ -7114,7 +7480,7 @@
           <a:p>
             <a:fld id="{04426929-A8C9-4C88-B674-D857B16FADC0}" type="datetimeFigureOut">
               <a:rPr lang="en-US" smtClean="0"/>
-              <a:t>3/22/2020</a:t>
+              <a:t>3/23/2020</a:t>
             </a:fld>
             <a:endParaRPr lang="en-US"/>
           </a:p>
@@ -7322,7 +7688,7 @@
           <a:p>
             <a:fld id="{04426929-A8C9-4C88-B674-D857B16FADC0}" type="datetimeFigureOut">
               <a:rPr lang="en-US" smtClean="0"/>
-              <a:t>3/22/2020</a:t>
+              <a:t>3/23/2020</a:t>
             </a:fld>
             <a:endParaRPr lang="en-US"/>
           </a:p>
@@ -7520,7 +7886,7 @@
           <a:p>
             <a:fld id="{04094055-DDB8-4252-8AC2-F30314B42EE4}" type="datetimeFigureOut">
               <a:rPr lang="en-US" smtClean="0"/>
-              <a:t>3/22/2020</a:t>
+              <a:t>3/23/2020</a:t>
             </a:fld>
             <a:endParaRPr lang="en-US"/>
           </a:p>
@@ -7718,7 +8084,7 @@
           <a:p>
             <a:fld id="{04426929-A8C9-4C88-B674-D857B16FADC0}" type="datetimeFigureOut">
               <a:rPr lang="en-US" smtClean="0"/>
-              <a:t>3/22/2020</a:t>
+              <a:t>3/23/2020</a:t>
             </a:fld>
             <a:endParaRPr lang="en-US"/>
           </a:p>
@@ -7993,7 +8359,7 @@
           <a:p>
             <a:fld id="{04426929-A8C9-4C88-B674-D857B16FADC0}" type="datetimeFigureOut">
               <a:rPr lang="en-US" smtClean="0"/>
-              <a:t>3/22/2020</a:t>
+              <a:t>3/23/2020</a:t>
             </a:fld>
             <a:endParaRPr lang="en-US"/>
           </a:p>
@@ -8258,7 +8624,7 @@
           <a:p>
             <a:fld id="{04426929-A8C9-4C88-B674-D857B16FADC0}" type="datetimeFigureOut">
               <a:rPr lang="en-US" smtClean="0"/>
-              <a:t>3/22/2020</a:t>
+              <a:t>3/23/2020</a:t>
             </a:fld>
             <a:endParaRPr lang="en-US"/>
           </a:p>
@@ -8670,7 +9036,7 @@
           <a:p>
             <a:fld id="{04426929-A8C9-4C88-B674-D857B16FADC0}" type="datetimeFigureOut">
               <a:rPr lang="en-US" smtClean="0"/>
-              <a:t>3/22/2020</a:t>
+              <a:t>3/23/2020</a:t>
             </a:fld>
             <a:endParaRPr lang="en-US"/>
           </a:p>
@@ -8811,7 +9177,7 @@
           <a:p>
             <a:fld id="{04426929-A8C9-4C88-B674-D857B16FADC0}" type="datetimeFigureOut">
               <a:rPr lang="en-US" smtClean="0"/>
-              <a:t>3/22/2020</a:t>
+              <a:t>3/23/2020</a:t>
             </a:fld>
             <a:endParaRPr lang="en-US"/>
           </a:p>
@@ -8924,7 +9290,7 @@
           <a:p>
             <a:fld id="{04426929-A8C9-4C88-B674-D857B16FADC0}" type="datetimeFigureOut">
               <a:rPr lang="en-US" smtClean="0"/>
-              <a:t>3/22/2020</a:t>
+              <a:t>3/23/2020</a:t>
             </a:fld>
             <a:endParaRPr lang="en-US"/>
           </a:p>
@@ -9235,7 +9601,7 @@
           <a:p>
             <a:fld id="{04426929-A8C9-4C88-B674-D857B16FADC0}" type="datetimeFigureOut">
               <a:rPr lang="en-US" smtClean="0"/>
-              <a:t>3/22/2020</a:t>
+              <a:t>3/23/2020</a:t>
             </a:fld>
             <a:endParaRPr lang="en-US"/>
           </a:p>
@@ -9523,7 +9889,7 @@
           <a:p>
             <a:fld id="{04426929-A8C9-4C88-B674-D857B16FADC0}" type="datetimeFigureOut">
               <a:rPr lang="en-US" smtClean="0"/>
-              <a:t>3/22/2020</a:t>
+              <a:t>3/23/2020</a:t>
             </a:fld>
             <a:endParaRPr lang="en-US"/>
           </a:p>
@@ -9764,7 +10130,7 @@
           <a:p>
             <a:fld id="{04426929-A8C9-4C88-B674-D857B16FADC0}" type="datetimeFigureOut">
               <a:rPr lang="en-US" smtClean="0"/>
-              <a:t>3/22/2020</a:t>
+              <a:t>3/23/2020</a:t>
             </a:fld>
             <a:endParaRPr lang="en-US"/>
           </a:p>
@@ -10332,7 +10698,7 @@
           <a:p>
             <a:fld id="{04094055-DDB8-4252-8AC2-F30314B42EE4}" type="datetimeFigureOut">
               <a:rPr lang="en-US" smtClean="0"/>
-              <a:t>3/22/2020</a:t>
+              <a:t>3/23/2020</a:t>
             </a:fld>
             <a:endParaRPr lang="en-US"/>
           </a:p>
@@ -14860,10 +15226,10 @@
                       <m:t>=</m:t>
                     </m:r>
                     <m:r>
-                      <a:rPr lang="en-US" i="1">
+                      <a:rPr lang="en-US" b="0" i="1" smtClean="0">
                         <a:latin typeface="Cambria Math" panose="02040503050406030204" pitchFamily="18" charset="0"/>
                       </a:rPr>
-                      <m:t>𝛼</m:t>
+                      <m:t>𝑞</m:t>
                     </m:r>
                     <m:sSup>
                       <m:sSupPr>
@@ -14914,215 +15280,114 @@
                 <a:pPr lvl="1"/>
                 <a14:m>
                   <m:oMath xmlns:m="http://schemas.openxmlformats.org/officeDocument/2006/math">
-                    <m:sSub>
-                      <m:sSubPr>
+                    <m:r>
+                      <a:rPr lang="en-US" b="0" i="1" smtClean="0">
+                        <a:latin typeface="Cambria Math" panose="02040503050406030204" pitchFamily="18" charset="0"/>
+                        <a:cs typeface="Arial" panose="020B0604020202020204" pitchFamily="34" charset="0"/>
+                      </a:rPr>
+                      <m:t>𝐶𝑃𝑈𝐸</m:t>
+                    </m:r>
+                    <m:r>
+                      <a:rPr lang="en-US" b="0" i="1" smtClean="0">
+                        <a:latin typeface="Cambria Math" panose="02040503050406030204" pitchFamily="18" charset="0"/>
+                        <a:cs typeface="Arial" panose="020B0604020202020204" pitchFamily="34" charset="0"/>
+                      </a:rPr>
+                      <m:t>=</m:t>
+                    </m:r>
+                    <m:r>
+                      <a:rPr lang="en-US" b="0" i="1" smtClean="0">
+                        <a:latin typeface="Cambria Math" panose="02040503050406030204" pitchFamily="18" charset="0"/>
+                        <a:cs typeface="Arial" panose="020B0604020202020204" pitchFamily="34" charset="0"/>
+                      </a:rPr>
+                      <m:t>𝑞</m:t>
+                    </m:r>
+                    <m:sSup>
+                      <m:sSupPr>
                         <m:ctrlPr>
-                          <a:rPr lang="en-US" i="1" smtClean="0">
+                          <a:rPr lang="en-US" b="0" i="1" smtClean="0">
                             <a:latin typeface="Cambria Math" panose="02040503050406030204" pitchFamily="18" charset="0"/>
                             <a:cs typeface="Arial" panose="020B0604020202020204" pitchFamily="34" charset="0"/>
                           </a:rPr>
                         </m:ctrlPr>
-                      </m:sSubPr>
+                      </m:sSupPr>
                       <m:e>
-                        <m:func>
-                          <m:funcPr>
-                            <m:ctrlPr>
-                              <a:rPr lang="en-US" b="0" i="1" smtClean="0">
-                                <a:latin typeface="Cambria Math" panose="02040503050406030204" pitchFamily="18" charset="0"/>
-                                <a:cs typeface="Arial" panose="020B0604020202020204" pitchFamily="34" charset="0"/>
-                              </a:rPr>
-                            </m:ctrlPr>
-                          </m:funcPr>
-                          <m:fName>
-                            <m:r>
-                              <m:rPr>
-                                <m:sty m:val="p"/>
-                              </m:rPr>
-                              <a:rPr lang="en-US" b="0" i="0" smtClean="0">
-                                <a:latin typeface="Cambria Math" panose="02040503050406030204" pitchFamily="18" charset="0"/>
-                                <a:cs typeface="Arial" panose="020B0604020202020204" pitchFamily="34" charset="0"/>
-                              </a:rPr>
-                              <m:t>log</m:t>
-                            </m:r>
-                          </m:fName>
-                          <m:e>
-                            <m:d>
-                              <m:dPr>
-                                <m:ctrlPr>
-                                  <a:rPr lang="en-US" b="0" i="1" smtClean="0">
-                                    <a:latin typeface="Cambria Math" panose="02040503050406030204" pitchFamily="18" charset="0"/>
-                                    <a:cs typeface="Arial" panose="020B0604020202020204" pitchFamily="34" charset="0"/>
-                                  </a:rPr>
-                                </m:ctrlPr>
-                              </m:dPr>
-                              <m:e>
-                                <m:r>
-                                  <a:rPr lang="en-US" b="0" i="1" smtClean="0">
-                                    <a:latin typeface="Cambria Math" panose="02040503050406030204" pitchFamily="18" charset="0"/>
-                                    <a:cs typeface="Arial" panose="020B0604020202020204" pitchFamily="34" charset="0"/>
-                                  </a:rPr>
-                                  <m:t>𝐶𝑃𝑈𝐸</m:t>
-                                </m:r>
-                              </m:e>
-                            </m:d>
-                          </m:e>
-                        </m:func>
                         <m:r>
                           <a:rPr lang="en-US" b="0" i="1" smtClean="0">
                             <a:latin typeface="Cambria Math" panose="02040503050406030204" pitchFamily="18" charset="0"/>
                             <a:cs typeface="Arial" panose="020B0604020202020204" pitchFamily="34" charset="0"/>
                           </a:rPr>
-                          <m:t>=</m:t>
-                        </m:r>
-                        <m:r>
-                          <a:rPr lang="en-US" i="1">
-                            <a:latin typeface="Cambria Math" panose="02040503050406030204" pitchFamily="18" charset="0"/>
-                            <a:ea typeface="Cambria Math" panose="02040503050406030204" pitchFamily="18" charset="0"/>
-                            <a:cs typeface="Arial" panose="020B0604020202020204" pitchFamily="34" charset="0"/>
-                          </a:rPr>
-                          <m:t>𝛽</m:t>
+                          <m:t>𝑁</m:t>
                         </m:r>
                       </m:e>
-                      <m:sub>
+                      <m:sup>
                         <m:r>
                           <a:rPr lang="en-US" b="0" i="1" smtClean="0">
                             <a:latin typeface="Cambria Math" panose="02040503050406030204" pitchFamily="18" charset="0"/>
                             <a:cs typeface="Arial" panose="020B0604020202020204" pitchFamily="34" charset="0"/>
                           </a:rPr>
-                          <m:t>0 </m:t>
+                          <m:t>(</m:t>
                         </m:r>
-                      </m:sub>
-                    </m:sSub>
-                    <m:r>
-                      <a:rPr lang="en-US" b="0" i="0" smtClean="0">
-                        <a:latin typeface="Cambria Math" panose="02040503050406030204" pitchFamily="18" charset="0"/>
-                        <a:cs typeface="Arial" panose="020B0604020202020204" pitchFamily="34" charset="0"/>
-                      </a:rPr>
-                      <m:t>+ </m:t>
-                    </m:r>
-                    <m:sSub>
-                      <m:sSubPr>
-                        <m:ctrlPr>
-                          <a:rPr lang="el-GR" b="0" i="1" smtClean="0">
-                            <a:latin typeface="Cambria Math" panose="02040503050406030204" pitchFamily="18" charset="0"/>
-                            <a:ea typeface="Cambria Math" panose="02040503050406030204" pitchFamily="18" charset="0"/>
-                            <a:cs typeface="Arial" panose="020B0604020202020204" pitchFamily="34" charset="0"/>
-                          </a:rPr>
-                        </m:ctrlPr>
-                      </m:sSubPr>
-                      <m:e>
-                        <m:r>
-                          <a:rPr lang="el-GR" b="0" i="1" smtClean="0">
-                            <a:latin typeface="Cambria Math" panose="02040503050406030204" pitchFamily="18" charset="0"/>
-                            <a:ea typeface="Cambria Math" panose="02040503050406030204" pitchFamily="18" charset="0"/>
-                            <a:cs typeface="Arial" panose="020B0604020202020204" pitchFamily="34" charset="0"/>
-                          </a:rPr>
-                          <m:t>𝛽</m:t>
-                        </m:r>
-                      </m:e>
-                      <m:sub>
                         <m:r>
                           <a:rPr lang="en-US" b="0" i="1" smtClean="0">
                             <a:latin typeface="Cambria Math" panose="02040503050406030204" pitchFamily="18" charset="0"/>
                             <a:ea typeface="Cambria Math" panose="02040503050406030204" pitchFamily="18" charset="0"/>
                             <a:cs typeface="Arial" panose="020B0604020202020204" pitchFamily="34" charset="0"/>
                           </a:rPr>
-                          <m:t>1</m:t>
+                          <m:t>𝛼</m:t>
                         </m:r>
-                      </m:sub>
-                    </m:sSub>
-                    <m:r>
-                      <a:rPr lang="el-GR" b="0" i="1" smtClean="0">
-                        <a:latin typeface="Cambria Math" panose="02040503050406030204" pitchFamily="18" charset="0"/>
-                        <a:ea typeface="Cambria Math" panose="02040503050406030204" pitchFamily="18" charset="0"/>
-                        <a:cs typeface="Arial" panose="020B0604020202020204" pitchFamily="34" charset="0"/>
-                      </a:rPr>
-                      <m:t>∙</m:t>
-                    </m:r>
-                    <m:r>
-                      <m:rPr>
-                        <m:sty m:val="p"/>
-                      </m:rPr>
-                      <a:rPr lang="en-US" b="0" i="0" smtClean="0">
-                        <a:latin typeface="Cambria Math" panose="02040503050406030204" pitchFamily="18" charset="0"/>
-                        <a:ea typeface="Cambria Math" panose="02040503050406030204" pitchFamily="18" charset="0"/>
-                        <a:cs typeface="Arial" panose="020B0604020202020204" pitchFamily="34" charset="0"/>
-                      </a:rPr>
-                      <m:t>log</m:t>
-                    </m:r>
-                    <m:r>
-                      <a:rPr lang="en-US" b="0" i="1" smtClean="0">
-                        <a:latin typeface="Cambria Math" panose="02040503050406030204" pitchFamily="18" charset="0"/>
-                        <a:ea typeface="Cambria Math" panose="02040503050406030204" pitchFamily="18" charset="0"/>
-                        <a:cs typeface="Arial" panose="020B0604020202020204" pitchFamily="34" charset="0"/>
-                      </a:rPr>
-                      <m:t>⁡(</m:t>
-                    </m:r>
-                    <m:r>
-                      <a:rPr lang="en-US" b="0" i="1" smtClean="0">
-                        <a:latin typeface="Cambria Math" panose="02040503050406030204" pitchFamily="18" charset="0"/>
-                        <a:ea typeface="Cambria Math" panose="02040503050406030204" pitchFamily="18" charset="0"/>
-                        <a:cs typeface="Arial" panose="020B0604020202020204" pitchFamily="34" charset="0"/>
-                      </a:rPr>
-                      <m:t>𝑒𝑓𝐶𝑃𝑈𝐸</m:t>
-                    </m:r>
-                    <m:r>
-                      <a:rPr lang="en-US" b="0" i="1" smtClean="0">
-                        <a:latin typeface="Cambria Math" panose="02040503050406030204" pitchFamily="18" charset="0"/>
-                        <a:ea typeface="Cambria Math" panose="02040503050406030204" pitchFamily="18" charset="0"/>
-                        <a:cs typeface="Arial" panose="020B0604020202020204" pitchFamily="34" charset="0"/>
-                      </a:rPr>
-                      <m:t>)+ </m:t>
-                    </m:r>
-                    <m:sSub>
-                      <m:sSubPr>
-                        <m:ctrlPr>
-                          <a:rPr lang="en-US" b="0" i="1" smtClean="0">
-                            <a:latin typeface="Cambria Math" panose="02040503050406030204" pitchFamily="18" charset="0"/>
-                            <a:ea typeface="Cambria Math" panose="02040503050406030204" pitchFamily="18" charset="0"/>
-                            <a:cs typeface="Arial" panose="020B0604020202020204" pitchFamily="34" charset="0"/>
-                          </a:rPr>
-                        </m:ctrlPr>
-                      </m:sSubPr>
-                      <m:e>
                         <m:r>
                           <a:rPr lang="en-US" b="0" i="1" smtClean="0">
                             <a:latin typeface="Cambria Math" panose="02040503050406030204" pitchFamily="18" charset="0"/>
                             <a:ea typeface="Cambria Math" panose="02040503050406030204" pitchFamily="18" charset="0"/>
                             <a:cs typeface="Arial" panose="020B0604020202020204" pitchFamily="34" charset="0"/>
                           </a:rPr>
-                          <m:t>𝛽</m:t>
+                          <m:t>0+</m:t>
                         </m:r>
-                      </m:e>
-                      <m:sub>
                         <m:r>
                           <a:rPr lang="en-US" b="0" i="1" smtClean="0">
                             <a:latin typeface="Cambria Math" panose="02040503050406030204" pitchFamily="18" charset="0"/>
                             <a:ea typeface="Cambria Math" panose="02040503050406030204" pitchFamily="18" charset="0"/>
                             <a:cs typeface="Arial" panose="020B0604020202020204" pitchFamily="34" charset="0"/>
                           </a:rPr>
-                          <m:t>2</m:t>
+                          <m:t>𝛼</m:t>
                         </m:r>
-                      </m:sub>
-                    </m:sSub>
-                    <m:r>
-                      <a:rPr lang="en-US" b="0" i="1" smtClean="0">
-                        <a:latin typeface="Cambria Math" panose="02040503050406030204" pitchFamily="18" charset="0"/>
-                        <a:ea typeface="Cambria Math" panose="02040503050406030204" pitchFamily="18" charset="0"/>
-                        <a:cs typeface="Arial" panose="020B0604020202020204" pitchFamily="34" charset="0"/>
-                      </a:rPr>
-                      <m:t>∙</m:t>
-                    </m:r>
-                    <m:r>
-                      <a:rPr lang="en-US" b="0" i="1" smtClean="0">
-                        <a:latin typeface="Cambria Math" panose="02040503050406030204" pitchFamily="18" charset="0"/>
-                        <a:ea typeface="Cambria Math" panose="02040503050406030204" pitchFamily="18" charset="0"/>
-                        <a:cs typeface="Arial" panose="020B0604020202020204" pitchFamily="34" charset="0"/>
-                      </a:rPr>
-                      <m:t>𝑠𝑝𝑒𝑐𝑖𝑒𝑠</m:t>
-                    </m:r>
+                        <m:r>
+                          <a:rPr lang="en-US" b="0" i="1" smtClean="0">
+                            <a:latin typeface="Cambria Math" panose="02040503050406030204" pitchFamily="18" charset="0"/>
+                            <a:ea typeface="Cambria Math" panose="02040503050406030204" pitchFamily="18" charset="0"/>
+                            <a:cs typeface="Arial" panose="020B0604020202020204" pitchFamily="34" charset="0"/>
+                          </a:rPr>
+                          <m:t>1∗</m:t>
+                        </m:r>
+                        <m:r>
+                          <a:rPr lang="en-US" b="0" i="1" smtClean="0">
+                            <a:latin typeface="Cambria Math" panose="02040503050406030204" pitchFamily="18" charset="0"/>
+                            <a:ea typeface="Cambria Math" panose="02040503050406030204" pitchFamily="18" charset="0"/>
+                            <a:cs typeface="Arial" panose="020B0604020202020204" pitchFamily="34" charset="0"/>
+                          </a:rPr>
+                          <m:t>𝑆𝑝𝑒𝑐𝑖𝑒𝑠</m:t>
+                        </m:r>
+                        <m:r>
+                          <a:rPr lang="en-US" b="0" i="1" smtClean="0">
+                            <a:latin typeface="Cambria Math" panose="02040503050406030204" pitchFamily="18" charset="0"/>
+                            <a:ea typeface="Cambria Math" panose="02040503050406030204" pitchFamily="18" charset="0"/>
+                            <a:cs typeface="Arial" panose="020B0604020202020204" pitchFamily="34" charset="0"/>
+                          </a:rPr>
+                          <m:t>)</m:t>
+                        </m:r>
+                      </m:sup>
+                    </m:sSup>
                   </m:oMath>
                 </a14:m>
+                <a:endParaRPr lang="en-US" dirty="0">
+                  <a:latin typeface="Arial" panose="020B0604020202020204" pitchFamily="34" charset="0"/>
+                  <a:cs typeface="Arial" panose="020B0604020202020204" pitchFamily="34" charset="0"/>
+                </a:endParaRPr>
+              </a:p>
+              <a:p>
+                <a:pPr marL="457200" lvl="1" indent="0">
+                  <a:buNone/>
+                </a:pPr>
                 <a:endParaRPr lang="en-US" dirty="0">
                   <a:latin typeface="Arial" panose="020B0604020202020204" pitchFamily="34" charset="0"/>
                   <a:cs typeface="Arial" panose="020B0604020202020204" pitchFamily="34" charset="0"/>

</xml_diff>